<commit_message>
Upload new copies of slides
</commit_message>
<xml_diff>
--- a/session_five/session_five_presentation.pptx
+++ b/session_five/session_five_presentation.pptx
@@ -850,9 +850,6 @@
     </pc:docChg>
   </pc:docChgLst>
   <pc:docChgLst>
-    <pc:chgData name="Bradley, Sam" userId="f75c196c-0419-4ed7-9101-2e14ae32ff77" providerId="ADAL" clId="{3FF446AA-2460-4900-8B64-80B2BFB30CB0}"/>
-  </pc:docChgLst>
-  <pc:docChgLst>
     <pc:chgData name="McKinney, David" userId="S::kqkh779@astrazeneca.net::8b945cb3-78ce-42d7-adc5-b07bab32cd5b" providerId="AD" clId="Web-{2BB45DB9-A5C7-42D9-8D86-58E9C0F106AD}"/>
     <pc:docChg chg="modSld">
       <pc:chgData name="McKinney, David" userId="S::kqkh779@astrazeneca.net::8b945cb3-78ce-42d7-adc5-b07bab32cd5b" providerId="AD" clId="Web-{2BB45DB9-A5C7-42D9-8D86-58E9C0F106AD}" dt="2020-03-26T12:03:13.542" v="3" actId="20577"/>
@@ -962,7 +959,7 @@
             <a:fld id="{3BBED7E8-0829-F34C-B479-A757805E6C1B}" type="datetimeFigureOut">
               <a:rPr lang="en-US" smtClean="0"/>
               <a:pPr/>
-              <a:t>5/16/2020</a:t>
+              <a:t>4/12/2021</a:t>
             </a:fld>
             <a:endParaRPr lang="en-US"/>
           </a:p>
@@ -1130,7 +1127,7 @@
             <a:fld id="{6C7E4F11-7667-5045-A00B-01970EA44BB5}" type="datetimeFigureOut">
               <a:rPr lang="en-US" smtClean="0"/>
               <a:pPr/>
-              <a:t>5/16/2020</a:t>
+              <a:t>4/12/2021</a:t>
             </a:fld>
             <a:endParaRPr lang="en-US"/>
           </a:p>
@@ -30083,15 +30080,32 @@
                 <a:latin typeface="Consolas" panose="020B0609020204030204" pitchFamily="49" charset="0"/>
                 <a:cs typeface="Arial"/>
               </a:rPr>
-              <a:t>index % 2 == 0</a:t>
-            </a:r>
-            <a:r>
-              <a:rPr lang="en-GB" sz="2000" dirty="0">
+              <a:t>index % 2 == </a:t>
+            </a:r>
+            <a:r>
+              <a:rPr lang="en-GB" sz="2000">
+                <a:latin typeface="Consolas" panose="020B0609020204030204" pitchFamily="49" charset="0"/>
+                <a:cs typeface="Arial"/>
+              </a:rPr>
+              <a:t>0</a:t>
+            </a:r>
+            <a:r>
+              <a:rPr lang="en-GB" sz="2000">
                 <a:latin typeface="Arial"/>
                 <a:cs typeface="Arial"/>
               </a:rPr>
               <a:t>`)</a:t>
             </a:r>
+          </a:p>
+          <a:p>
+            <a:pPr marL="342900" indent="-342900">
+              <a:buFont typeface="Arial"/>
+              <a:buChar char="•"/>
+            </a:pPr>
+            <a:endParaRPr lang="en-GB" sz="2000" dirty="0">
+              <a:latin typeface="Arial"/>
+              <a:cs typeface="Arial"/>
+            </a:endParaRPr>
           </a:p>
           <a:p>
             <a:pPr marL="342900" indent="-342900">
@@ -35299,24 +35313,6 @@
 </file>
 
 <file path=customXml/item2.xml><?xml version="1.0" encoding="utf-8"?>
-<p:properties xmlns:p="http://schemas.microsoft.com/office/2006/metadata/properties" xmlns:xsi="http://www.w3.org/2001/XMLSchema-instance" xmlns:pc="http://schemas.microsoft.com/office/infopath/2007/PartnerControls">
-  <documentManagement>
-    <Keyword xmlns="44a56295-c29e-4898-8136-a54736c65b82" xsi:nil="true"/>
-    <Descriptions xmlns="44a56295-c29e-4898-8136-a54736c65b82" xsi:nil="true"/>
-  </documentManagement>
-</p:properties>
-</file>
-
-<file path=customXml/item3.xml><?xml version="1.0" encoding="utf-8"?>
-<?mso-contentType ?>
-<FormTemplates xmlns="http://schemas.microsoft.com/sharepoint/v3/contenttype/forms">
-  <Display>DocumentLibraryForm</Display>
-  <Edit>DocumentLibraryForm</Edit>
-  <New>DocumentLibraryForm</New>
-</FormTemplates>
-</file>
-
-<file path=customXml/item4.xml><?xml version="1.0" encoding="utf-8"?>
 <ct:contentTypeSchema xmlns:ct="http://schemas.microsoft.com/office/2006/metadata/contentType" xmlns:ma="http://schemas.microsoft.com/office/2006/metadata/properties/metaAttributes" ct:_="" ma:_="" ma:contentTypeName="Document" ma:contentTypeID="0x010100C9F3DD611966374C9EAA8DC5A2F94CD8" ma:contentTypeVersion="8" ma:contentTypeDescription="Create a new document." ma:contentTypeScope="" ma:versionID="18a8759320524e51783f13c6663a10d1">
   <xsd:schema xmlns:xsd="http://www.w3.org/2001/XMLSchema" xmlns:xs="http://www.w3.org/2001/XMLSchema" xmlns:p="http://schemas.microsoft.com/office/2006/metadata/properties" xmlns:ns2="44a56295-c29e-4898-8136-a54736c65b82" xmlns:ns3="9675ef8f-b755-4cd6-a742-8cae3d86c4fe" targetNamespace="http://schemas.microsoft.com/office/2006/metadata/properties" ma:root="true" ma:fieldsID="1b693415669a5bc10d56a9234ce5202b" ns2:_="" ns3:_="">
     <xsd:import namespace="44a56295-c29e-4898-8136-a54736c65b82"/>
@@ -35495,6 +35491,24 @@
 </ct:contentTypeSchema>
 </file>
 
+<file path=customXml/item3.xml><?xml version="1.0" encoding="utf-8"?>
+<?mso-contentType ?>
+<FormTemplates xmlns="http://schemas.microsoft.com/sharepoint/v3/contenttype/forms">
+  <Display>DocumentLibraryForm</Display>
+  <Edit>DocumentLibraryForm</Edit>
+  <New>DocumentLibraryForm</New>
+</FormTemplates>
+</file>
+
+<file path=customXml/item4.xml><?xml version="1.0" encoding="utf-8"?>
+<p:properties xmlns:p="http://schemas.microsoft.com/office/2006/metadata/properties" xmlns:xsi="http://www.w3.org/2001/XMLSchema-instance" xmlns:pc="http://schemas.microsoft.com/office/infopath/2007/PartnerControls">
+  <documentManagement>
+    <Keyword xmlns="44a56295-c29e-4898-8136-a54736c65b82" xsi:nil="true"/>
+    <Descriptions xmlns="44a56295-c29e-4898-8136-a54736c65b82" xsi:nil="true"/>
+  </documentManagement>
+</p:properties>
+</file>
+
 <file path=customXml/itemProps1.xml><?xml version="1.0" encoding="utf-8"?>
 <ds:datastoreItem xmlns:ds="http://schemas.openxmlformats.org/officeDocument/2006/customXml" ds:itemID="{91989A13-6EBC-4BFF-A25C-E4D3CAAA08AF}">
   <ds:schemaRefs>
@@ -35504,31 +35518,6 @@
 </file>
 
 <file path=customXml/itemProps2.xml><?xml version="1.0" encoding="utf-8"?>
-<ds:datastoreItem xmlns:ds="http://schemas.openxmlformats.org/officeDocument/2006/customXml" ds:itemID="{9F6F5FD0-A94F-4E0E-8953-A634089166A9}">
-  <ds:schemaRefs>
-    <ds:schemaRef ds:uri="44a56295-c29e-4898-8136-a54736c65b82"/>
-    <ds:schemaRef ds:uri="9675ef8f-b755-4cd6-a742-8cae3d86c4fe"/>
-    <ds:schemaRef ds:uri="http://purl.org/dc/dcmitype/"/>
-    <ds:schemaRef ds:uri="http://purl.org/dc/elements/1.1/"/>
-    <ds:schemaRef ds:uri="http://purl.org/dc/terms/"/>
-    <ds:schemaRef ds:uri="http://schemas.microsoft.com/office/2006/documentManagement/types"/>
-    <ds:schemaRef ds:uri="http://schemas.microsoft.com/office/2006/metadata/properties"/>
-    <ds:schemaRef ds:uri="http://schemas.microsoft.com/office/infopath/2007/PartnerControls"/>
-    <ds:schemaRef ds:uri="http://schemas.openxmlformats.org/package/2006/metadata/core-properties"/>
-    <ds:schemaRef ds:uri="http://www.w3.org/XML/1998/namespace"/>
-  </ds:schemaRefs>
-</ds:datastoreItem>
-</file>
-
-<file path=customXml/itemProps3.xml><?xml version="1.0" encoding="utf-8"?>
-<ds:datastoreItem xmlns:ds="http://schemas.openxmlformats.org/officeDocument/2006/customXml" ds:itemID="{BEBDFA33-3959-412D-BF65-F572B77FF4EC}">
-  <ds:schemaRefs>
-    <ds:schemaRef ds:uri="http://schemas.microsoft.com/sharepoint/v3/contenttype/forms"/>
-  </ds:schemaRefs>
-</ds:datastoreItem>
-</file>
-
-<file path=customXml/itemProps4.xml><?xml version="1.0" encoding="utf-8"?>
 <ds:datastoreItem xmlns:ds="http://schemas.openxmlformats.org/officeDocument/2006/customXml" ds:itemID="{68ED3CC4-90A9-4466-8611-49F71BEF9534}">
   <ds:schemaRefs>
     <ds:schemaRef ds:uri="44a56295-c29e-4898-8136-a54736c65b82"/>
@@ -35545,4 +35534,29 @@
     <ds:schemaRef ds:uri="http://www.w3.org/2001/XMLSchema"/>
   </ds:schemaRefs>
 </ds:datastoreItem>
+</file>
+
+<file path=customXml/itemProps3.xml><?xml version="1.0" encoding="utf-8"?>
+<ds:datastoreItem xmlns:ds="http://schemas.openxmlformats.org/officeDocument/2006/customXml" ds:itemID="{BEBDFA33-3959-412D-BF65-F572B77FF4EC}">
+  <ds:schemaRefs>
+    <ds:schemaRef ds:uri="http://schemas.microsoft.com/sharepoint/v3/contenttype/forms"/>
+  </ds:schemaRefs>
+</ds:datastoreItem>
+</file>
+
+<file path=customXml/itemProps4.xml><?xml version="1.0" encoding="utf-8"?>
+<ds:datastoreItem xmlns:ds="http://schemas.openxmlformats.org/officeDocument/2006/customXml" ds:itemID="{9F6F5FD0-A94F-4E0E-8953-A634089166A9}">
+  <ds:schemaRefs>
+    <ds:schemaRef ds:uri="44a56295-c29e-4898-8136-a54736c65b82"/>
+    <ds:schemaRef ds:uri="9675ef8f-b755-4cd6-a742-8cae3d86c4fe"/>
+    <ds:schemaRef ds:uri="http://purl.org/dc/dcmitype/"/>
+    <ds:schemaRef ds:uri="http://purl.org/dc/elements/1.1/"/>
+    <ds:schemaRef ds:uri="http://purl.org/dc/terms/"/>
+    <ds:schemaRef ds:uri="http://schemas.microsoft.com/office/2006/documentManagement/types"/>
+    <ds:schemaRef ds:uri="http://schemas.microsoft.com/office/2006/metadata/properties"/>
+    <ds:schemaRef ds:uri="http://schemas.microsoft.com/office/infopath/2007/PartnerControls"/>
+    <ds:schemaRef ds:uri="http://schemas.openxmlformats.org/package/2006/metadata/core-properties"/>
+    <ds:schemaRef ds:uri="http://www.w3.org/XML/1998/namespace"/>
+  </ds:schemaRefs>
+</ds:datastoreItem>
 </file>
</xml_diff>